<commit_message>
Udpating executive summary pages
</commit_message>
<xml_diff>
--- a/webpage/_site/images/exec_summary/Malaysia_exec_summary.pptx
+++ b/webpage/_site/images/exec_summary/Malaysia_exec_summary.pptx
@@ -11,8 +11,8 @@
     <p:handoutMasterId r:id="rId15"/>
   </p:handoutMasterIdLst>
   <p:sldIdLst>
-    <p:sldId id="269" r:id="rId5"/>
-    <p:sldId id="270" r:id="rId6"/>
+    <p:sldId id="270" r:id="rId5"/>
+    <p:sldId id="269" r:id="rId6"/>
     <p:sldId id="271" r:id="rId7"/>
     <p:sldId id="275" r:id="rId8"/>
     <p:sldId id="273" r:id="rId9"/>
@@ -757,7 +757,7 @@
     </p:spTree>
     <p:extLst>
       <p:ext uri="{BB962C8B-B14F-4D97-AF65-F5344CB8AC3E}">
-        <p14:creationId xmlns:p14="http://schemas.microsoft.com/office/powerpoint/2010/main" val="2316666254"/>
+        <p14:creationId xmlns:p14="http://schemas.microsoft.com/office/powerpoint/2010/main" val="173244387"/>
       </p:ext>
     </p:extLst>
   </p:cSld>
@@ -841,7 +841,7 @@
     </p:spTree>
     <p:extLst>
       <p:ext uri="{BB962C8B-B14F-4D97-AF65-F5344CB8AC3E}">
-        <p14:creationId xmlns:p14="http://schemas.microsoft.com/office/powerpoint/2010/main" val="173244387"/>
+        <p14:creationId xmlns:p14="http://schemas.microsoft.com/office/powerpoint/2010/main" val="2316666254"/>
       </p:ext>
     </p:extLst>
   </p:cSld>
@@ -6751,6 +6751,409 @@
           <a:chExt cx="0" cy="0"/>
         </a:xfrm>
       </p:grpSpPr>
+      <p:sp>
+        <p:nvSpPr>
+          <p:cNvPr id="2" name="Slide Number Placeholder 1">
+            <a:extLst>
+              <a:ext uri="{FF2B5EF4-FFF2-40B4-BE49-F238E27FC236}">
+                <a16:creationId xmlns:a16="http://schemas.microsoft.com/office/drawing/2014/main" id="{0A11C858-69E1-D2F2-FEE8-76694C7B74BA}"/>
+              </a:ext>
+            </a:extLst>
+          </p:cNvPr>
+          <p:cNvSpPr>
+            <a:spLocks noGrp="1"/>
+          </p:cNvSpPr>
+          <p:nvPr>
+            <p:ph type="sldNum" sz="quarter" idx="4294967295"/>
+          </p:nvPr>
+        </p:nvSpPr>
+        <p:spPr>
+          <a:xfrm>
+            <a:off x="13994296" y="7772400"/>
+            <a:ext cx="453223" cy="457200"/>
+          </a:xfrm>
+          <a:prstGeom prst="rect">
+            <a:avLst/>
+          </a:prstGeom>
+        </p:spPr>
+        <p:txBody>
+          <a:bodyPr/>
+          <a:lstStyle/>
+          <a:p>
+            <a:fld id="{FE7A4BB3-E848-5A44-82DF-322201952CD8}" type="slidenum">
+              <a:rPr lang="en-US" smtClean="0"/>
+              <a:pPr/>
+              <a:t>1</a:t>
+            </a:fld>
+            <a:endParaRPr lang="en-US"/>
+          </a:p>
+        </p:txBody>
+      </p:sp>
+      <p:sp>
+        <p:nvSpPr>
+          <p:cNvPr id="4" name="Content Placeholder 3">
+            <a:extLst>
+              <a:ext uri="{FF2B5EF4-FFF2-40B4-BE49-F238E27FC236}">
+                <a16:creationId xmlns:a16="http://schemas.microsoft.com/office/drawing/2014/main" id="{CEA06FCF-29DB-EDB6-FA9A-F73F99CEFA15}"/>
+              </a:ext>
+            </a:extLst>
+          </p:cNvPr>
+          <p:cNvSpPr>
+            <a:spLocks noGrp="1"/>
+          </p:cNvSpPr>
+          <p:nvPr>
+            <p:ph sz="quarter" idx="20"/>
+          </p:nvPr>
+        </p:nvSpPr>
+        <p:spPr>
+          <a:xfrm>
+            <a:off x="2071955" y="1089209"/>
+            <a:ext cx="11704320" cy="5501031"/>
+          </a:xfrm>
+        </p:spPr>
+        <p:txBody>
+          <a:bodyPr/>
+          <a:lstStyle/>
+          <a:p>
+            <a:pPr marL="0" indent="0">
+              <a:buNone/>
+            </a:pPr>
+            <a:r>
+              <a:rPr lang="en-US"/>
+              <a:t>Strategies to reach net zero emissions by 2050 rely heavily on </a:t>
+            </a:r>
+            <a:r>
+              <a:rPr lang="en-US" b="1">
+                <a:solidFill>
+                  <a:srgbClr val="D77600"/>
+                </a:solidFill>
+              </a:rPr>
+              <a:t>electrification</a:t>
+            </a:r>
+            <a:r>
+              <a:rPr lang="en-US"/>
+              <a:t> across sectors and </a:t>
+            </a:r>
+            <a:r>
+              <a:rPr lang="en-US" b="1">
+                <a:solidFill>
+                  <a:srgbClr val="D77600"/>
+                </a:solidFill>
+              </a:rPr>
+              <a:t>decarbonization</a:t>
+            </a:r>
+            <a:r>
+              <a:rPr lang="en-US"/>
+              <a:t> of the power sector.</a:t>
+            </a:r>
+          </a:p>
+          <a:p>
+            <a:pPr marL="0" indent="0">
+              <a:buNone/>
+            </a:pPr>
+            <a:endParaRPr lang="en-US"/>
+          </a:p>
+          <a:p>
+            <a:pPr marL="0" indent="0">
+              <a:buNone/>
+            </a:pPr>
+            <a:r>
+              <a:rPr lang="en-US" b="1">
+                <a:solidFill>
+                  <a:srgbClr val="D77600"/>
+                </a:solidFill>
+              </a:rPr>
+              <a:t>Energy efficiency </a:t>
+            </a:r>
+            <a:r>
+              <a:rPr lang="en-US"/>
+              <a:t>and </a:t>
+            </a:r>
+            <a:r>
+              <a:rPr lang="en-US" b="1">
+                <a:solidFill>
+                  <a:srgbClr val="D77600"/>
+                </a:solidFill>
+              </a:rPr>
+              <a:t>demand-side measures </a:t>
+            </a:r>
+            <a:r>
+              <a:rPr lang="en-US"/>
+              <a:t>will majorly contribute to decarbonization efforts.</a:t>
+            </a:r>
+          </a:p>
+          <a:p>
+            <a:pPr marL="0" indent="0">
+              <a:buNone/>
+            </a:pPr>
+            <a:endParaRPr lang="en-US"/>
+          </a:p>
+          <a:p>
+            <a:pPr marL="0" indent="0">
+              <a:buNone/>
+            </a:pPr>
+            <a:r>
+              <a:rPr lang="en-US"/>
+              <a:t>Hard-to-mitigate sectors will require the use of advanced technologies like </a:t>
+            </a:r>
+            <a:r>
+              <a:rPr lang="en-US" b="1">
+                <a:solidFill>
+                  <a:srgbClr val="D77600"/>
+                </a:solidFill>
+              </a:rPr>
+              <a:t>carbon capture and storage </a:t>
+            </a:r>
+            <a:r>
+              <a:rPr lang="en-US"/>
+              <a:t>and </a:t>
+            </a:r>
+            <a:r>
+              <a:rPr lang="en-US" b="1">
+                <a:solidFill>
+                  <a:srgbClr val="D77600"/>
+                </a:solidFill>
+              </a:rPr>
+              <a:t>hydrogen fuel</a:t>
+            </a:r>
+            <a:r>
+              <a:rPr lang="en-US"/>
+              <a:t>.</a:t>
+            </a:r>
+          </a:p>
+          <a:p>
+            <a:pPr marL="0" indent="0">
+              <a:buNone/>
+            </a:pPr>
+            <a:endParaRPr lang="en-US"/>
+          </a:p>
+          <a:p>
+            <a:pPr marL="0" indent="0">
+              <a:buNone/>
+            </a:pPr>
+            <a:r>
+              <a:rPr lang="en-US" b="1">
+                <a:solidFill>
+                  <a:srgbClr val="D77600"/>
+                </a:solidFill>
+              </a:rPr>
+              <a:t>Cities</a:t>
+            </a:r>
+            <a:r>
+              <a:rPr lang="en-US"/>
+              <a:t> will play a </a:t>
+            </a:r>
+            <a:r>
+              <a:rPr lang="en-US" b="1">
+                <a:solidFill>
+                  <a:srgbClr val="D77600"/>
+                </a:solidFill>
+              </a:rPr>
+              <a:t>key role </a:t>
+            </a:r>
+            <a:r>
+              <a:rPr lang="en-US"/>
+              <a:t>in national decarbonization strategies.</a:t>
+            </a:r>
+          </a:p>
+        </p:txBody>
+      </p:sp>
+      <p:pic>
+        <p:nvPicPr>
+          <p:cNvPr id="5" name="Graphic 4" descr="City outline">
+            <a:extLst>
+              <a:ext uri="{FF2B5EF4-FFF2-40B4-BE49-F238E27FC236}">
+                <a16:creationId xmlns:a16="http://schemas.microsoft.com/office/drawing/2014/main" id="{11120B2B-41D6-39DA-0B8A-CC9BB35861DB}"/>
+              </a:ext>
+            </a:extLst>
+          </p:cNvPr>
+          <p:cNvPicPr>
+            <a:picLocks noGrp="1" noChangeAspect="1"/>
+          </p:cNvPicPr>
+          <p:nvPr/>
+        </p:nvPicPr>
+        <p:blipFill>
+          <a:blip r:embed="rId3">
+            <a:extLst>
+              <a:ext uri="{96DAC541-7B7A-43D3-8B79-37D633B846F1}">
+                <asvg:svgBlip xmlns:asvg="http://schemas.microsoft.com/office/drawing/2016/SVG/main" r:embed="rId4"/>
+              </a:ext>
+            </a:extLst>
+          </a:blip>
+          <a:srcRect/>
+          <a:stretch>
+            <a:fillRect/>
+          </a:stretch>
+        </p:blipFill>
+        <p:spPr>
+          <a:xfrm>
+            <a:off x="983250" y="5272663"/>
+            <a:ext cx="853489" cy="853489"/>
+          </a:xfrm>
+          <a:prstGeom prst="ellipse">
+            <a:avLst/>
+          </a:prstGeom>
+          <a:solidFill>
+            <a:schemeClr val="tx2"/>
+          </a:solidFill>
+        </p:spPr>
+      </p:pic>
+      <p:pic>
+        <p:nvPicPr>
+          <p:cNvPr id="6" name="Graphic 5" descr="Electric Tower outline">
+            <a:extLst>
+              <a:ext uri="{FF2B5EF4-FFF2-40B4-BE49-F238E27FC236}">
+                <a16:creationId xmlns:a16="http://schemas.microsoft.com/office/drawing/2014/main" id="{291C207B-E70C-6F5B-C803-1F45BEE19444}"/>
+              </a:ext>
+            </a:extLst>
+          </p:cNvPr>
+          <p:cNvPicPr>
+            <a:picLocks noGrp="1" noChangeAspect="1"/>
+          </p:cNvPicPr>
+          <p:nvPr/>
+        </p:nvPicPr>
+        <p:blipFill>
+          <a:blip r:embed="rId5">
+            <a:extLst>
+              <a:ext uri="{96DAC541-7B7A-43D3-8B79-37D633B846F1}">
+                <asvg:svgBlip xmlns:asvg="http://schemas.microsoft.com/office/drawing/2016/SVG/main" r:embed="rId6"/>
+              </a:ext>
+            </a:extLst>
+          </a:blip>
+          <a:srcRect l="93" r="93"/>
+          <a:stretch>
+            <a:fillRect/>
+          </a:stretch>
+        </p:blipFill>
+        <p:spPr>
+          <a:xfrm>
+            <a:off x="983671" y="973849"/>
+            <a:ext cx="853489" cy="853489"/>
+          </a:xfrm>
+          <a:prstGeom prst="ellipse">
+            <a:avLst/>
+          </a:prstGeom>
+          <a:solidFill>
+            <a:schemeClr val="tx2"/>
+          </a:solidFill>
+        </p:spPr>
+      </p:pic>
+      <p:pic>
+        <p:nvPicPr>
+          <p:cNvPr id="7" name="Graphic 6" descr="Sustainability outline">
+            <a:extLst>
+              <a:ext uri="{FF2B5EF4-FFF2-40B4-BE49-F238E27FC236}">
+                <a16:creationId xmlns:a16="http://schemas.microsoft.com/office/drawing/2014/main" id="{B2DE7DA8-36B0-9267-5779-EA0D1FA49325}"/>
+              </a:ext>
+            </a:extLst>
+          </p:cNvPr>
+          <p:cNvPicPr>
+            <a:picLocks noGrp="1" noChangeAspect="1"/>
+          </p:cNvPicPr>
+          <p:nvPr/>
+        </p:nvPicPr>
+        <p:blipFill>
+          <a:blip r:embed="rId7">
+            <a:extLst>
+              <a:ext uri="{96DAC541-7B7A-43D3-8B79-37D633B846F1}">
+                <asvg:svgBlip xmlns:asvg="http://schemas.microsoft.com/office/drawing/2016/SVG/main" r:embed="rId8"/>
+              </a:ext>
+            </a:extLst>
+          </a:blip>
+          <a:srcRect/>
+          <a:stretch>
+            <a:fillRect/>
+          </a:stretch>
+        </p:blipFill>
+        <p:spPr>
+          <a:xfrm>
+            <a:off x="983250" y="2406787"/>
+            <a:ext cx="853489" cy="853489"/>
+          </a:xfrm>
+          <a:prstGeom prst="ellipse">
+            <a:avLst/>
+          </a:prstGeom>
+          <a:solidFill>
+            <a:schemeClr val="tx2"/>
+          </a:solidFill>
+        </p:spPr>
+      </p:pic>
+      <p:pic>
+        <p:nvPicPr>
+          <p:cNvPr id="8" name="Picture 7" descr="Icon&#10;&#10;Description automatically generated">
+            <a:extLst>
+              <a:ext uri="{FF2B5EF4-FFF2-40B4-BE49-F238E27FC236}">
+                <a16:creationId xmlns:a16="http://schemas.microsoft.com/office/drawing/2014/main" id="{78AA8100-47E8-D9FB-087C-2C98596F0ED6}"/>
+              </a:ext>
+            </a:extLst>
+          </p:cNvPr>
+          <p:cNvPicPr>
+            <a:picLocks noGrp="1" noChangeAspect="1"/>
+          </p:cNvPicPr>
+          <p:nvPr/>
+        </p:nvPicPr>
+        <p:blipFill>
+          <a:blip r:embed="rId9"/>
+          <a:srcRect l="93" r="93"/>
+          <a:stretch>
+            <a:fillRect/>
+          </a:stretch>
+        </p:blipFill>
+        <p:spPr>
+          <a:xfrm>
+            <a:off x="983250" y="3839725"/>
+            <a:ext cx="853489" cy="853489"/>
+          </a:xfrm>
+          <a:prstGeom prst="ellipse">
+            <a:avLst/>
+          </a:prstGeom>
+          <a:solidFill>
+            <a:schemeClr val="tx2"/>
+          </a:solidFill>
+        </p:spPr>
+      </p:pic>
+    </p:spTree>
+    <p:extLst>
+      <p:ext uri="{BB962C8B-B14F-4D97-AF65-F5344CB8AC3E}">
+        <p14:creationId xmlns:p14="http://schemas.microsoft.com/office/powerpoint/2010/main" val="376433321"/>
+      </p:ext>
+    </p:extLst>
+  </p:cSld>
+  <p:clrMapOvr>
+    <a:masterClrMapping/>
+  </p:clrMapOvr>
+  <mc:AlternateContent xmlns:mc="http://schemas.openxmlformats.org/markup-compatibility/2006" xmlns:p14="http://schemas.microsoft.com/office/powerpoint/2010/main">
+    <mc:Choice Requires="p14">
+      <p:transition spd="med" p14:dur="700">
+        <p:fade/>
+      </p:transition>
+    </mc:Choice>
+    <mc:Fallback xmlns="">
+      <p:transition spd="med">
+        <p:fade/>
+      </p:transition>
+    </mc:Fallback>
+  </mc:AlternateContent>
+</p:sld>
+</file>
+
+<file path=ppt/slides/slide2.xml><?xml version="1.0" encoding="utf-8"?>
+<p:sld xmlns:a="http://schemas.openxmlformats.org/drawingml/2006/main" xmlns:r="http://schemas.openxmlformats.org/officeDocument/2006/relationships" xmlns:p="http://schemas.openxmlformats.org/presentationml/2006/main">
+  <p:cSld>
+    <p:spTree>
+      <p:nvGrpSpPr>
+        <p:cNvPr id="1" name=""/>
+        <p:cNvGrpSpPr/>
+        <p:nvPr/>
+      </p:nvGrpSpPr>
+      <p:grpSpPr>
+        <a:xfrm>
+          <a:off x="0" y="0"/>
+          <a:ext cx="0" cy="0"/>
+          <a:chOff x="0" y="0"/>
+          <a:chExt cx="0" cy="0"/>
+        </a:xfrm>
+      </p:grpSpPr>
       <p:pic>
         <p:nvPicPr>
           <p:cNvPr id="49" name="Picture 48" descr="Chart, waterfall chart&#10;&#10;Description automatically generated">
@@ -9304,409 +9707,6 @@
     <p:extLst>
       <p:ext uri="{BB962C8B-B14F-4D97-AF65-F5344CB8AC3E}">
         <p14:creationId xmlns:p14="http://schemas.microsoft.com/office/powerpoint/2010/main" val="409708086"/>
-      </p:ext>
-    </p:extLst>
-  </p:cSld>
-  <p:clrMapOvr>
-    <a:masterClrMapping/>
-  </p:clrMapOvr>
-  <mc:AlternateContent xmlns:mc="http://schemas.openxmlformats.org/markup-compatibility/2006" xmlns:p14="http://schemas.microsoft.com/office/powerpoint/2010/main">
-    <mc:Choice Requires="p14">
-      <p:transition spd="med" p14:dur="700">
-        <p:fade/>
-      </p:transition>
-    </mc:Choice>
-    <mc:Fallback xmlns="">
-      <p:transition spd="med">
-        <p:fade/>
-      </p:transition>
-    </mc:Fallback>
-  </mc:AlternateContent>
-</p:sld>
-</file>
-
-<file path=ppt/slides/slide2.xml><?xml version="1.0" encoding="utf-8"?>
-<p:sld xmlns:a="http://schemas.openxmlformats.org/drawingml/2006/main" xmlns:r="http://schemas.openxmlformats.org/officeDocument/2006/relationships" xmlns:p="http://schemas.openxmlformats.org/presentationml/2006/main">
-  <p:cSld>
-    <p:spTree>
-      <p:nvGrpSpPr>
-        <p:cNvPr id="1" name=""/>
-        <p:cNvGrpSpPr/>
-        <p:nvPr/>
-      </p:nvGrpSpPr>
-      <p:grpSpPr>
-        <a:xfrm>
-          <a:off x="0" y="0"/>
-          <a:ext cx="0" cy="0"/>
-          <a:chOff x="0" y="0"/>
-          <a:chExt cx="0" cy="0"/>
-        </a:xfrm>
-      </p:grpSpPr>
-      <p:sp>
-        <p:nvSpPr>
-          <p:cNvPr id="2" name="Slide Number Placeholder 1">
-            <a:extLst>
-              <a:ext uri="{FF2B5EF4-FFF2-40B4-BE49-F238E27FC236}">
-                <a16:creationId xmlns:a16="http://schemas.microsoft.com/office/drawing/2014/main" id="{0A11C858-69E1-D2F2-FEE8-76694C7B74BA}"/>
-              </a:ext>
-            </a:extLst>
-          </p:cNvPr>
-          <p:cNvSpPr>
-            <a:spLocks noGrp="1"/>
-          </p:cNvSpPr>
-          <p:nvPr>
-            <p:ph type="sldNum" sz="quarter" idx="4294967295"/>
-          </p:nvPr>
-        </p:nvSpPr>
-        <p:spPr>
-          <a:xfrm>
-            <a:off x="13994296" y="7772400"/>
-            <a:ext cx="453223" cy="457200"/>
-          </a:xfrm>
-          <a:prstGeom prst="rect">
-            <a:avLst/>
-          </a:prstGeom>
-        </p:spPr>
-        <p:txBody>
-          <a:bodyPr/>
-          <a:lstStyle/>
-          <a:p>
-            <a:fld id="{FE7A4BB3-E848-5A44-82DF-322201952CD8}" type="slidenum">
-              <a:rPr lang="en-US" smtClean="0"/>
-              <a:pPr/>
-              <a:t>2</a:t>
-            </a:fld>
-            <a:endParaRPr lang="en-US"/>
-          </a:p>
-        </p:txBody>
-      </p:sp>
-      <p:sp>
-        <p:nvSpPr>
-          <p:cNvPr id="4" name="Content Placeholder 3">
-            <a:extLst>
-              <a:ext uri="{FF2B5EF4-FFF2-40B4-BE49-F238E27FC236}">
-                <a16:creationId xmlns:a16="http://schemas.microsoft.com/office/drawing/2014/main" id="{CEA06FCF-29DB-EDB6-FA9A-F73F99CEFA15}"/>
-              </a:ext>
-            </a:extLst>
-          </p:cNvPr>
-          <p:cNvSpPr>
-            <a:spLocks noGrp="1"/>
-          </p:cNvSpPr>
-          <p:nvPr>
-            <p:ph sz="quarter" idx="20"/>
-          </p:nvPr>
-        </p:nvSpPr>
-        <p:spPr>
-          <a:xfrm>
-            <a:off x="2071955" y="1089209"/>
-            <a:ext cx="11704320" cy="5501031"/>
-          </a:xfrm>
-        </p:spPr>
-        <p:txBody>
-          <a:bodyPr/>
-          <a:lstStyle/>
-          <a:p>
-            <a:pPr marL="0" indent="0">
-              <a:buNone/>
-            </a:pPr>
-            <a:r>
-              <a:rPr lang="en-US"/>
-              <a:t>Strategies to reach net zero emissions by 2050 rely heavily on </a:t>
-            </a:r>
-            <a:r>
-              <a:rPr lang="en-US" b="1">
-                <a:solidFill>
-                  <a:srgbClr val="D77600"/>
-                </a:solidFill>
-              </a:rPr>
-              <a:t>electrification</a:t>
-            </a:r>
-            <a:r>
-              <a:rPr lang="en-US"/>
-              <a:t> across sectors and </a:t>
-            </a:r>
-            <a:r>
-              <a:rPr lang="en-US" b="1">
-                <a:solidFill>
-                  <a:srgbClr val="D77600"/>
-                </a:solidFill>
-              </a:rPr>
-              <a:t>decarbonization</a:t>
-            </a:r>
-            <a:r>
-              <a:rPr lang="en-US"/>
-              <a:t> of the power sector.</a:t>
-            </a:r>
-          </a:p>
-          <a:p>
-            <a:pPr marL="0" indent="0">
-              <a:buNone/>
-            </a:pPr>
-            <a:endParaRPr lang="en-US"/>
-          </a:p>
-          <a:p>
-            <a:pPr marL="0" indent="0">
-              <a:buNone/>
-            </a:pPr>
-            <a:r>
-              <a:rPr lang="en-US" b="1">
-                <a:solidFill>
-                  <a:srgbClr val="D77600"/>
-                </a:solidFill>
-              </a:rPr>
-              <a:t>Energy efficiency </a:t>
-            </a:r>
-            <a:r>
-              <a:rPr lang="en-US"/>
-              <a:t>and </a:t>
-            </a:r>
-            <a:r>
-              <a:rPr lang="en-US" b="1">
-                <a:solidFill>
-                  <a:srgbClr val="D77600"/>
-                </a:solidFill>
-              </a:rPr>
-              <a:t>demand-side measures </a:t>
-            </a:r>
-            <a:r>
-              <a:rPr lang="en-US"/>
-              <a:t>will majorly contribute to decarbonization efforts.</a:t>
-            </a:r>
-          </a:p>
-          <a:p>
-            <a:pPr marL="0" indent="0">
-              <a:buNone/>
-            </a:pPr>
-            <a:endParaRPr lang="en-US"/>
-          </a:p>
-          <a:p>
-            <a:pPr marL="0" indent="0">
-              <a:buNone/>
-            </a:pPr>
-            <a:r>
-              <a:rPr lang="en-US"/>
-              <a:t>Hard-to-mitigate sectors will require the use of advanced technologies like </a:t>
-            </a:r>
-            <a:r>
-              <a:rPr lang="en-US" b="1">
-                <a:solidFill>
-                  <a:srgbClr val="D77600"/>
-                </a:solidFill>
-              </a:rPr>
-              <a:t>carbon capture and storage </a:t>
-            </a:r>
-            <a:r>
-              <a:rPr lang="en-US"/>
-              <a:t>and </a:t>
-            </a:r>
-            <a:r>
-              <a:rPr lang="en-US" b="1">
-                <a:solidFill>
-                  <a:srgbClr val="D77600"/>
-                </a:solidFill>
-              </a:rPr>
-              <a:t>hydrogen fuel</a:t>
-            </a:r>
-            <a:r>
-              <a:rPr lang="en-US"/>
-              <a:t>.</a:t>
-            </a:r>
-          </a:p>
-          <a:p>
-            <a:pPr marL="0" indent="0">
-              <a:buNone/>
-            </a:pPr>
-            <a:endParaRPr lang="en-US"/>
-          </a:p>
-          <a:p>
-            <a:pPr marL="0" indent="0">
-              <a:buNone/>
-            </a:pPr>
-            <a:r>
-              <a:rPr lang="en-US" b="1">
-                <a:solidFill>
-                  <a:srgbClr val="D77600"/>
-                </a:solidFill>
-              </a:rPr>
-              <a:t>Cities</a:t>
-            </a:r>
-            <a:r>
-              <a:rPr lang="en-US"/>
-              <a:t> will play a </a:t>
-            </a:r>
-            <a:r>
-              <a:rPr lang="en-US" b="1">
-                <a:solidFill>
-                  <a:srgbClr val="D77600"/>
-                </a:solidFill>
-              </a:rPr>
-              <a:t>key role </a:t>
-            </a:r>
-            <a:r>
-              <a:rPr lang="en-US"/>
-              <a:t>in national decarbonization strategies.</a:t>
-            </a:r>
-          </a:p>
-        </p:txBody>
-      </p:sp>
-      <p:pic>
-        <p:nvPicPr>
-          <p:cNvPr id="5" name="Graphic 4" descr="City outline">
-            <a:extLst>
-              <a:ext uri="{FF2B5EF4-FFF2-40B4-BE49-F238E27FC236}">
-                <a16:creationId xmlns:a16="http://schemas.microsoft.com/office/drawing/2014/main" id="{11120B2B-41D6-39DA-0B8A-CC9BB35861DB}"/>
-              </a:ext>
-            </a:extLst>
-          </p:cNvPr>
-          <p:cNvPicPr>
-            <a:picLocks noGrp="1" noChangeAspect="1"/>
-          </p:cNvPicPr>
-          <p:nvPr/>
-        </p:nvPicPr>
-        <p:blipFill>
-          <a:blip r:embed="rId3">
-            <a:extLst>
-              <a:ext uri="{96DAC541-7B7A-43D3-8B79-37D633B846F1}">
-                <asvg:svgBlip xmlns:asvg="http://schemas.microsoft.com/office/drawing/2016/SVG/main" r:embed="rId4"/>
-              </a:ext>
-            </a:extLst>
-          </a:blip>
-          <a:srcRect/>
-          <a:stretch>
-            <a:fillRect/>
-          </a:stretch>
-        </p:blipFill>
-        <p:spPr>
-          <a:xfrm>
-            <a:off x="983250" y="5272663"/>
-            <a:ext cx="853489" cy="853489"/>
-          </a:xfrm>
-          <a:prstGeom prst="ellipse">
-            <a:avLst/>
-          </a:prstGeom>
-          <a:solidFill>
-            <a:schemeClr val="tx2"/>
-          </a:solidFill>
-        </p:spPr>
-      </p:pic>
-      <p:pic>
-        <p:nvPicPr>
-          <p:cNvPr id="6" name="Graphic 5" descr="Electric Tower outline">
-            <a:extLst>
-              <a:ext uri="{FF2B5EF4-FFF2-40B4-BE49-F238E27FC236}">
-                <a16:creationId xmlns:a16="http://schemas.microsoft.com/office/drawing/2014/main" id="{291C207B-E70C-6F5B-C803-1F45BEE19444}"/>
-              </a:ext>
-            </a:extLst>
-          </p:cNvPr>
-          <p:cNvPicPr>
-            <a:picLocks noGrp="1" noChangeAspect="1"/>
-          </p:cNvPicPr>
-          <p:nvPr/>
-        </p:nvPicPr>
-        <p:blipFill>
-          <a:blip r:embed="rId5">
-            <a:extLst>
-              <a:ext uri="{96DAC541-7B7A-43D3-8B79-37D633B846F1}">
-                <asvg:svgBlip xmlns:asvg="http://schemas.microsoft.com/office/drawing/2016/SVG/main" r:embed="rId6"/>
-              </a:ext>
-            </a:extLst>
-          </a:blip>
-          <a:srcRect l="93" r="93"/>
-          <a:stretch>
-            <a:fillRect/>
-          </a:stretch>
-        </p:blipFill>
-        <p:spPr>
-          <a:xfrm>
-            <a:off x="983671" y="973849"/>
-            <a:ext cx="853489" cy="853489"/>
-          </a:xfrm>
-          <a:prstGeom prst="ellipse">
-            <a:avLst/>
-          </a:prstGeom>
-          <a:solidFill>
-            <a:schemeClr val="tx2"/>
-          </a:solidFill>
-        </p:spPr>
-      </p:pic>
-      <p:pic>
-        <p:nvPicPr>
-          <p:cNvPr id="7" name="Graphic 6" descr="Sustainability outline">
-            <a:extLst>
-              <a:ext uri="{FF2B5EF4-FFF2-40B4-BE49-F238E27FC236}">
-                <a16:creationId xmlns:a16="http://schemas.microsoft.com/office/drawing/2014/main" id="{B2DE7DA8-36B0-9267-5779-EA0D1FA49325}"/>
-              </a:ext>
-            </a:extLst>
-          </p:cNvPr>
-          <p:cNvPicPr>
-            <a:picLocks noGrp="1" noChangeAspect="1"/>
-          </p:cNvPicPr>
-          <p:nvPr/>
-        </p:nvPicPr>
-        <p:blipFill>
-          <a:blip r:embed="rId7">
-            <a:extLst>
-              <a:ext uri="{96DAC541-7B7A-43D3-8B79-37D633B846F1}">
-                <asvg:svgBlip xmlns:asvg="http://schemas.microsoft.com/office/drawing/2016/SVG/main" r:embed="rId8"/>
-              </a:ext>
-            </a:extLst>
-          </a:blip>
-          <a:srcRect/>
-          <a:stretch>
-            <a:fillRect/>
-          </a:stretch>
-        </p:blipFill>
-        <p:spPr>
-          <a:xfrm>
-            <a:off x="983250" y="2406787"/>
-            <a:ext cx="853489" cy="853489"/>
-          </a:xfrm>
-          <a:prstGeom prst="ellipse">
-            <a:avLst/>
-          </a:prstGeom>
-          <a:solidFill>
-            <a:schemeClr val="tx2"/>
-          </a:solidFill>
-        </p:spPr>
-      </p:pic>
-      <p:pic>
-        <p:nvPicPr>
-          <p:cNvPr id="8" name="Picture 7" descr="Icon&#10;&#10;Description automatically generated">
-            <a:extLst>
-              <a:ext uri="{FF2B5EF4-FFF2-40B4-BE49-F238E27FC236}">
-                <a16:creationId xmlns:a16="http://schemas.microsoft.com/office/drawing/2014/main" id="{78AA8100-47E8-D9FB-087C-2C98596F0ED6}"/>
-              </a:ext>
-            </a:extLst>
-          </p:cNvPr>
-          <p:cNvPicPr>
-            <a:picLocks noGrp="1" noChangeAspect="1"/>
-          </p:cNvPicPr>
-          <p:nvPr/>
-        </p:nvPicPr>
-        <p:blipFill>
-          <a:blip r:embed="rId9"/>
-          <a:srcRect l="93" r="93"/>
-          <a:stretch>
-            <a:fillRect/>
-          </a:stretch>
-        </p:blipFill>
-        <p:spPr>
-          <a:xfrm>
-            <a:off x="983250" y="3839725"/>
-            <a:ext cx="853489" cy="853489"/>
-          </a:xfrm>
-          <a:prstGeom prst="ellipse">
-            <a:avLst/>
-          </a:prstGeom>
-          <a:solidFill>
-            <a:schemeClr val="tx2"/>
-          </a:solidFill>
-        </p:spPr>
-      </p:pic>
-    </p:spTree>
-    <p:extLst>
-      <p:ext uri="{BB962C8B-B14F-4D97-AF65-F5344CB8AC3E}">
-        <p14:creationId xmlns:p14="http://schemas.microsoft.com/office/powerpoint/2010/main" val="376433321"/>
       </p:ext>
     </p:extLst>
   </p:cSld>

</xml_diff>